<commit_message>
Add all assignment, xpath with different locators
</commit_message>
<xml_diff>
--- a/Locators/SeleniumDay13_Locators.pptx
+++ b/Locators/SeleniumDay13_Locators.pptx
@@ -234,7 +234,7 @@
           <a:p>
             <a:fld id="{A605F676-A6B6-8148-86E2-E735BD0FF1E2}" type="datetimeFigureOut">
               <a:rPr lang="en-US" smtClean="0"/>
-              <a:t>9/9/19</a:t>
+              <a:t>9/18/19</a:t>
             </a:fld>
             <a:endParaRPr lang="en-US"/>
           </a:p>
@@ -1246,7 +1246,7 @@
           <a:p>
             <a:fld id="{D3F66FD2-14C2-594E-848D-E3896F0DC34E}" type="datetime1">
               <a:rPr lang="en-IN" smtClean="0"/>
-              <a:t>09/09/19</a:t>
+              <a:t>18/09/19</a:t>
             </a:fld>
             <a:endParaRPr lang="en-US" dirty="0"/>
           </a:p>
@@ -1502,7 +1502,7 @@
           <a:p>
             <a:fld id="{00BA250E-B57C-5E48-9BB3-79B407A82B41}" type="datetime1">
               <a:rPr lang="en-IN" smtClean="0"/>
-              <a:t>09/09/19</a:t>
+              <a:t>18/09/19</a:t>
             </a:fld>
             <a:endParaRPr lang="en-US" dirty="0"/>
           </a:p>
@@ -1821,7 +1821,7 @@
           <a:p>
             <a:fld id="{952CA38B-6F9D-6745-8797-F905EC79B83C}" type="datetime1">
               <a:rPr lang="en-IN" smtClean="0"/>
-              <a:t>09/09/19</a:t>
+              <a:t>18/09/19</a:t>
             </a:fld>
             <a:endParaRPr lang="en-US" dirty="0"/>
           </a:p>
@@ -2159,7 +2159,7 @@
           <a:p>
             <a:fld id="{CFC49B03-224A-FA4C-80F8-F203A7099DA4}" type="datetime1">
               <a:rPr lang="en-IN" smtClean="0"/>
-              <a:t>09/09/19</a:t>
+              <a:t>18/09/19</a:t>
             </a:fld>
             <a:endParaRPr lang="en-US" dirty="0"/>
           </a:p>
@@ -2478,7 +2478,7 @@
           <a:p>
             <a:fld id="{9089AB84-6D56-B240-B73B-5F7ED6647364}" type="datetime1">
               <a:rPr lang="en-IN" smtClean="0"/>
-              <a:t>09/09/19</a:t>
+              <a:t>18/09/19</a:t>
             </a:fld>
             <a:endParaRPr lang="en-US" dirty="0"/>
           </a:p>
@@ -2876,7 +2876,7 @@
           <a:p>
             <a:fld id="{8EEA4B7D-64AD-4442-BF90-4B5E99B028F4}" type="datetime1">
               <a:rPr lang="en-IN" smtClean="0"/>
-              <a:t>09/09/19</a:t>
+              <a:t>18/09/19</a:t>
             </a:fld>
             <a:endParaRPr lang="en-US" dirty="0"/>
           </a:p>
@@ -3051,7 +3051,7 @@
           <a:p>
             <a:fld id="{3296831E-6735-F94A-8237-CE7E3A7D498F}" type="datetime1">
               <a:rPr lang="en-IN" smtClean="0"/>
-              <a:t>09/09/19</a:t>
+              <a:t>18/09/19</a:t>
             </a:fld>
             <a:endParaRPr lang="en-US" dirty="0"/>
           </a:p>
@@ -3235,7 +3235,7 @@
           <a:p>
             <a:fld id="{490F175A-A2CB-D84D-A6D6-F58140F2CBCA}" type="datetime1">
               <a:rPr lang="en-IN" smtClean="0"/>
-              <a:t>09/09/19</a:t>
+              <a:t>18/09/19</a:t>
             </a:fld>
             <a:endParaRPr lang="en-US" dirty="0"/>
           </a:p>
@@ -3410,7 +3410,7 @@
           <a:p>
             <a:fld id="{135388A0-B0A3-5D49-8BF4-9BE5FB348540}" type="datetime1">
               <a:rPr lang="en-IN" smtClean="0"/>
-              <a:t>09/09/19</a:t>
+              <a:t>18/09/19</a:t>
             </a:fld>
             <a:endParaRPr lang="en-US" dirty="0"/>
           </a:p>
@@ -3662,7 +3662,7 @@
           <a:p>
             <a:fld id="{A362C76C-36F6-CC46-A66F-773C8F61A43D}" type="datetime1">
               <a:rPr lang="en-IN" smtClean="0"/>
-              <a:t>09/09/19</a:t>
+              <a:t>18/09/19</a:t>
             </a:fld>
             <a:endParaRPr lang="en-US" dirty="0"/>
           </a:p>
@@ -3899,7 +3899,7 @@
           <a:p>
             <a:fld id="{FC42C706-2515-8E47-A416-E41F78E7049A}" type="datetime1">
               <a:rPr lang="en-IN" smtClean="0"/>
-              <a:t>09/09/19</a:t>
+              <a:t>18/09/19</a:t>
             </a:fld>
             <a:endParaRPr lang="en-US" dirty="0"/>
           </a:p>
@@ -4277,7 +4277,7 @@
           <a:p>
             <a:fld id="{DE220CEC-135F-A34C-8DDB-B14121DF6FA6}" type="datetime1">
               <a:rPr lang="en-IN" smtClean="0"/>
-              <a:t>09/09/19</a:t>
+              <a:t>18/09/19</a:t>
             </a:fld>
             <a:endParaRPr lang="en-US" dirty="0"/>
           </a:p>
@@ -4405,7 +4405,7 @@
           <a:p>
             <a:fld id="{91461175-A794-4D4D-8B1B-8A3AED0271BA}" type="datetime1">
               <a:rPr lang="en-IN" smtClean="0"/>
-              <a:t>09/09/19</a:t>
+              <a:t>18/09/19</a:t>
             </a:fld>
             <a:endParaRPr lang="en-US" dirty="0"/>
           </a:p>
@@ -4505,7 +4505,7 @@
           <a:p>
             <a:fld id="{CC0E5C08-3A59-FD47-BBB9-E0529BC1253F}" type="datetime1">
               <a:rPr lang="en-IN" smtClean="0"/>
-              <a:t>09/09/19</a:t>
+              <a:t>18/09/19</a:t>
             </a:fld>
             <a:endParaRPr lang="en-US" dirty="0"/>
           </a:p>
@@ -4765,7 +4765,7 @@
           <a:p>
             <a:fld id="{FF77620C-1582-A744-9E10-440A7A00870E}" type="datetime1">
               <a:rPr lang="en-IN" smtClean="0"/>
-              <a:t>09/09/19</a:t>
+              <a:t>18/09/19</a:t>
             </a:fld>
             <a:endParaRPr lang="en-US" dirty="0"/>
           </a:p>
@@ -5079,7 +5079,7 @@
           <a:p>
             <a:fld id="{50DAD8AF-A805-D345-A7A4-EC299BD34CF5}" type="datetime1">
               <a:rPr lang="en-IN" smtClean="0"/>
-              <a:t>09/09/19</a:t>
+              <a:t>18/09/19</a:t>
             </a:fld>
             <a:endParaRPr lang="en-US" dirty="0"/>
           </a:p>
@@ -5781,7 +5781,7 @@
           <a:p>
             <a:fld id="{0F9E555D-47B2-1042-BD8F-85801F574F38}" type="datetime1">
               <a:rPr lang="en-IN" smtClean="0"/>
-              <a:t>09/09/19</a:t>
+              <a:t>18/09/19</a:t>
             </a:fld>
             <a:endParaRPr lang="en-US" dirty="0"/>
           </a:p>

</xml_diff>